<commit_message>
Fixed typos and workshop page hyperlinking
</commit_message>
<xml_diff>
--- a/content/fmatter/cover.pptx
+++ b/content/fmatter/cover.pptx
@@ -6,7 +6,6 @@
   </p:sldMasterIdLst>
   <p:sldIdLst>
     <p:sldId id="257" r:id="rId2"/>
-    <p:sldId id="258" r:id="rId3"/>
   </p:sldIdLst>
   <p:sldSz cx="5257800" cy="8001000"/>
   <p:notesSz cx="6858000" cy="9144000"/>
@@ -289,7 +288,7 @@
           <a:p>
             <a:fld id="{EA86068F-D492-514C-AF8C-493C4081BC9C}" type="datetimeFigureOut">
               <a:rPr lang="en-US" smtClean="0"/>
-              <a:t>6/10/14</a:t>
+              <a:t>6/13/14</a:t>
             </a:fld>
             <a:endParaRPr lang="en-US"/>
           </a:p>
@@ -459,7 +458,7 @@
           <a:p>
             <a:fld id="{EA86068F-D492-514C-AF8C-493C4081BC9C}" type="datetimeFigureOut">
               <a:rPr lang="en-US" smtClean="0"/>
-              <a:t>6/10/14</a:t>
+              <a:t>6/13/14</a:t>
             </a:fld>
             <a:endParaRPr lang="en-US"/>
           </a:p>
@@ -639,7 +638,7 @@
           <a:p>
             <a:fld id="{EA86068F-D492-514C-AF8C-493C4081BC9C}" type="datetimeFigureOut">
               <a:rPr lang="en-US" smtClean="0"/>
-              <a:t>6/10/14</a:t>
+              <a:t>6/13/14</a:t>
             </a:fld>
             <a:endParaRPr lang="en-US"/>
           </a:p>
@@ -809,7 +808,7 @@
           <a:p>
             <a:fld id="{EA86068F-D492-514C-AF8C-493C4081BC9C}" type="datetimeFigureOut">
               <a:rPr lang="en-US" smtClean="0"/>
-              <a:t>6/10/14</a:t>
+              <a:t>6/13/14</a:t>
             </a:fld>
             <a:endParaRPr lang="en-US"/>
           </a:p>
@@ -1055,7 +1054,7 @@
           <a:p>
             <a:fld id="{EA86068F-D492-514C-AF8C-493C4081BC9C}" type="datetimeFigureOut">
               <a:rPr lang="en-US" smtClean="0"/>
-              <a:t>6/10/14</a:t>
+              <a:t>6/13/14</a:t>
             </a:fld>
             <a:endParaRPr lang="en-US"/>
           </a:p>
@@ -1343,7 +1342,7 @@
           <a:p>
             <a:fld id="{EA86068F-D492-514C-AF8C-493C4081BC9C}" type="datetimeFigureOut">
               <a:rPr lang="en-US" smtClean="0"/>
-              <a:t>6/10/14</a:t>
+              <a:t>6/13/14</a:t>
             </a:fld>
             <a:endParaRPr lang="en-US"/>
           </a:p>
@@ -1765,7 +1764,7 @@
           <a:p>
             <a:fld id="{EA86068F-D492-514C-AF8C-493C4081BC9C}" type="datetimeFigureOut">
               <a:rPr lang="en-US" smtClean="0"/>
-              <a:t>6/10/14</a:t>
+              <a:t>6/13/14</a:t>
             </a:fld>
             <a:endParaRPr lang="en-US"/>
           </a:p>
@@ -1883,7 +1882,7 @@
           <a:p>
             <a:fld id="{EA86068F-D492-514C-AF8C-493C4081BC9C}" type="datetimeFigureOut">
               <a:rPr lang="en-US" smtClean="0"/>
-              <a:t>6/10/14</a:t>
+              <a:t>6/13/14</a:t>
             </a:fld>
             <a:endParaRPr lang="en-US"/>
           </a:p>
@@ -1978,7 +1977,7 @@
           <a:p>
             <a:fld id="{EA86068F-D492-514C-AF8C-493C4081BC9C}" type="datetimeFigureOut">
               <a:rPr lang="en-US" smtClean="0"/>
-              <a:t>6/10/14</a:t>
+              <a:t>6/13/14</a:t>
             </a:fld>
             <a:endParaRPr lang="en-US"/>
           </a:p>
@@ -2255,7 +2254,7 @@
           <a:p>
             <a:fld id="{EA86068F-D492-514C-AF8C-493C4081BC9C}" type="datetimeFigureOut">
               <a:rPr lang="en-US" smtClean="0"/>
-              <a:t>6/10/14</a:t>
+              <a:t>6/13/14</a:t>
             </a:fld>
             <a:endParaRPr lang="en-US"/>
           </a:p>
@@ -2508,7 +2507,7 @@
           <a:p>
             <a:fld id="{EA86068F-D492-514C-AF8C-493C4081BC9C}" type="datetimeFigureOut">
               <a:rPr lang="en-US" smtClean="0"/>
-              <a:t>6/10/14</a:t>
+              <a:t>6/13/14</a:t>
             </a:fld>
             <a:endParaRPr lang="en-US"/>
           </a:p>
@@ -2721,7 +2720,7 @@
           <a:p>
             <a:fld id="{EA86068F-D492-514C-AF8C-493C4081BC9C}" type="datetimeFigureOut">
               <a:rPr lang="en-US" smtClean="0"/>
-              <a:t>6/10/14</a:t>
+              <a:t>6/13/14</a:t>
             </a:fld>
             <a:endParaRPr lang="en-US"/>
           </a:p>
@@ -3317,16 +3316,7 @@
                 </a:solidFill>
                 <a:cs typeface="Arial" pitchFamily="34" charset="0"/>
               </a:rPr>
-              <a:t>The </a:t>
-            </a:r>
-            <a:r>
-              <a:rPr lang="en-US" b="1" dirty="0" smtClean="0">
-                <a:solidFill>
-                  <a:schemeClr val="bg1"/>
-                </a:solidFill>
-                <a:cs typeface="Arial" pitchFamily="34" charset="0"/>
-              </a:rPr>
-              <a:t>52</a:t>
+              <a:t>The 52</a:t>
             </a:r>
             <a:r>
               <a:rPr lang="en-US" b="1" baseline="30000" dirty="0" smtClean="0">
@@ -3564,505 +3554,6 @@
     <p:extLst>
       <p:ext uri="{BB962C8B-B14F-4D97-AF65-F5344CB8AC3E}">
         <p14:creationId xmlns:p14="http://schemas.microsoft.com/office/powerpoint/2010/main" val="3573925786"/>
-      </p:ext>
-    </p:extLst>
-  </p:cSld>
-  <p:clrMapOvr>
-    <a:masterClrMapping/>
-  </p:clrMapOvr>
-  <p:timing>
-    <p:tnLst>
-      <p:par>
-        <p:cTn xmlns:p14="http://schemas.microsoft.com/office/powerpoint/2010/main" id="1" dur="indefinite" restart="never" nodeType="tmRoot"/>
-      </p:par>
-    </p:tnLst>
-  </p:timing>
-</p:sld>
-</file>
-
-<file path=ppt/slides/slide2.xml><?xml version="1.0" encoding="utf-8"?>
-<p:sld xmlns:a="http://schemas.openxmlformats.org/drawingml/2006/main" xmlns:r="http://schemas.openxmlformats.org/officeDocument/2006/relationships" xmlns:p="http://schemas.openxmlformats.org/presentationml/2006/main">
-  <p:cSld>
-    <p:spTree>
-      <p:nvGrpSpPr>
-        <p:cNvPr id="1" name=""/>
-        <p:cNvGrpSpPr/>
-        <p:nvPr/>
-      </p:nvGrpSpPr>
-      <p:grpSpPr>
-        <a:xfrm>
-          <a:off x="0" y="0"/>
-          <a:ext cx="0" cy="0"/>
-          <a:chOff x="0" y="0"/>
-          <a:chExt cx="0" cy="0"/>
-        </a:xfrm>
-      </p:grpSpPr>
-      <p:sp>
-        <p:nvSpPr>
-          <p:cNvPr id="13" name="Rectangle 12"/>
-          <p:cNvSpPr/>
-          <p:nvPr/>
-        </p:nvSpPr>
-        <p:spPr>
-          <a:xfrm>
-            <a:off x="2553408" y="2485480"/>
-            <a:ext cx="419877" cy="289243"/>
-          </a:xfrm>
-          <a:prstGeom prst="rect">
-            <a:avLst/>
-          </a:prstGeom>
-          <a:solidFill>
-            <a:schemeClr val="bg1"/>
-          </a:solidFill>
-          <a:ln>
-            <a:solidFill>
-              <a:schemeClr val="bg1"/>
-            </a:solidFill>
-          </a:ln>
-        </p:spPr>
-        <p:style>
-          <a:lnRef idx="2">
-            <a:schemeClr val="accent1">
-              <a:shade val="50000"/>
-            </a:schemeClr>
-          </a:lnRef>
-          <a:fillRef idx="1">
-            <a:schemeClr val="accent1"/>
-          </a:fillRef>
-          <a:effectRef idx="0">
-            <a:schemeClr val="accent1"/>
-          </a:effectRef>
-          <a:fontRef idx="minor">
-            <a:schemeClr val="lt1"/>
-          </a:fontRef>
-        </p:style>
-        <p:txBody>
-          <a:bodyPr lIns="91425" tIns="45712" rIns="91425" bIns="45712" rtlCol="0" anchor="ctr"/>
-          <a:lstStyle/>
-          <a:p>
-            <a:pPr algn="ctr"/>
-            <a:endParaRPr lang="en-US"/>
-          </a:p>
-        </p:txBody>
-      </p:sp>
-      <p:sp>
-        <p:nvSpPr>
-          <p:cNvPr id="14" name="Rectangle 13"/>
-          <p:cNvSpPr/>
-          <p:nvPr/>
-        </p:nvSpPr>
-        <p:spPr>
-          <a:xfrm>
-            <a:off x="759551" y="2969377"/>
-            <a:ext cx="465073" cy="331133"/>
-          </a:xfrm>
-          <a:prstGeom prst="rect">
-            <a:avLst/>
-          </a:prstGeom>
-          <a:solidFill>
-            <a:schemeClr val="bg1"/>
-          </a:solidFill>
-          <a:ln>
-            <a:solidFill>
-              <a:schemeClr val="bg1"/>
-            </a:solidFill>
-          </a:ln>
-        </p:spPr>
-        <p:style>
-          <a:lnRef idx="2">
-            <a:schemeClr val="accent1">
-              <a:shade val="50000"/>
-            </a:schemeClr>
-          </a:lnRef>
-          <a:fillRef idx="1">
-            <a:schemeClr val="accent1"/>
-          </a:fillRef>
-          <a:effectRef idx="0">
-            <a:schemeClr val="accent1"/>
-          </a:effectRef>
-          <a:fontRef idx="minor">
-            <a:schemeClr val="lt1"/>
-          </a:fontRef>
-        </p:style>
-        <p:txBody>
-          <a:bodyPr lIns="91425" tIns="45712" rIns="91425" bIns="45712" rtlCol="0" anchor="ctr"/>
-          <a:lstStyle/>
-          <a:p>
-            <a:pPr algn="ctr"/>
-            <a:endParaRPr lang="en-US"/>
-          </a:p>
-        </p:txBody>
-      </p:sp>
-      <p:sp>
-        <p:nvSpPr>
-          <p:cNvPr id="15" name="Rectangle 14"/>
-          <p:cNvSpPr/>
-          <p:nvPr/>
-        </p:nvSpPr>
-        <p:spPr>
-          <a:xfrm>
-            <a:off x="757859" y="4646911"/>
-            <a:ext cx="839892" cy="379863"/>
-          </a:xfrm>
-          <a:prstGeom prst="rect">
-            <a:avLst/>
-          </a:prstGeom>
-          <a:solidFill>
-            <a:schemeClr val="bg1"/>
-          </a:solidFill>
-          <a:ln>
-            <a:solidFill>
-              <a:schemeClr val="bg1"/>
-            </a:solidFill>
-          </a:ln>
-        </p:spPr>
-        <p:style>
-          <a:lnRef idx="2">
-            <a:schemeClr val="accent1">
-              <a:shade val="50000"/>
-            </a:schemeClr>
-          </a:lnRef>
-          <a:fillRef idx="1">
-            <a:schemeClr val="accent1"/>
-          </a:fillRef>
-          <a:effectRef idx="0">
-            <a:schemeClr val="accent1"/>
-          </a:effectRef>
-          <a:fontRef idx="minor">
-            <a:schemeClr val="lt1"/>
-          </a:fontRef>
-        </p:style>
-        <p:txBody>
-          <a:bodyPr lIns="91425" tIns="45712" rIns="91425" bIns="45712" rtlCol="0" anchor="ctr"/>
-          <a:lstStyle/>
-          <a:p>
-            <a:pPr algn="ctr"/>
-            <a:endParaRPr lang="en-US"/>
-          </a:p>
-        </p:txBody>
-      </p:sp>
-      <p:pic>
-        <p:nvPicPr>
-          <p:cNvPr id="16" name="Picture 15"/>
-          <p:cNvPicPr>
-            <a:picLocks noChangeAspect="1"/>
-          </p:cNvPicPr>
-          <p:nvPr/>
-        </p:nvPicPr>
-        <p:blipFill>
-          <a:blip r:embed="rId2">
-            <a:extLst>
-              <a:ext uri="{28A0092B-C50C-407E-A947-70E740481C1C}">
-                <a14:useLocalDpi xmlns:a14="http://schemas.microsoft.com/office/drawing/2010/main" val="0"/>
-              </a:ext>
-            </a:extLst>
-          </a:blip>
-          <a:stretch>
-            <a:fillRect/>
-          </a:stretch>
-        </p:blipFill>
-        <p:spPr>
-          <a:xfrm>
-            <a:off x="911951" y="402847"/>
-            <a:ext cx="3329275" cy="2371876"/>
-          </a:xfrm>
-          <a:prstGeom prst="rect">
-            <a:avLst/>
-          </a:prstGeom>
-        </p:spPr>
-      </p:pic>
-      <p:sp>
-        <p:nvSpPr>
-          <p:cNvPr id="17" name="TextBox 16"/>
-          <p:cNvSpPr txBox="1"/>
-          <p:nvPr/>
-        </p:nvSpPr>
-        <p:spPr>
-          <a:xfrm>
-            <a:off x="0" y="3277962"/>
-            <a:ext cx="5257800" cy="3231638"/>
-          </a:xfrm>
-          <a:prstGeom prst="rect">
-            <a:avLst/>
-          </a:prstGeom>
-          <a:solidFill>
-            <a:schemeClr val="tx2">
-              <a:lumMod val="50000"/>
-            </a:schemeClr>
-          </a:solidFill>
-        </p:spPr>
-        <p:txBody>
-          <a:bodyPr wrap="square" lIns="91425" tIns="45712" rIns="91425" bIns="45712">
-            <a:spAutoFit/>
-          </a:bodyPr>
-          <a:lstStyle/>
-          <a:p>
-            <a:pPr algn="ctr">
-              <a:defRPr/>
-            </a:pPr>
-            <a:endParaRPr lang="en-US" b="1" dirty="0" smtClean="0">
-              <a:solidFill>
-                <a:schemeClr val="bg1"/>
-              </a:solidFill>
-              <a:cs typeface="Arial" pitchFamily="34" charset="0"/>
-            </a:endParaRPr>
-          </a:p>
-          <a:p>
-            <a:pPr algn="ctr">
-              <a:defRPr/>
-            </a:pPr>
-            <a:r>
-              <a:rPr lang="en-US" b="1" dirty="0" smtClean="0">
-                <a:solidFill>
-                  <a:schemeClr val="bg1"/>
-                </a:solidFill>
-                <a:cs typeface="Arial" pitchFamily="34" charset="0"/>
-              </a:rPr>
-              <a:t>The </a:t>
-            </a:r>
-            <a:r>
-              <a:rPr lang="en-US" b="1" dirty="0" smtClean="0">
-                <a:solidFill>
-                  <a:schemeClr val="bg1"/>
-                </a:solidFill>
-                <a:cs typeface="Arial" pitchFamily="34" charset="0"/>
-              </a:rPr>
-              <a:t>52</a:t>
-            </a:r>
-            <a:r>
-              <a:rPr lang="en-US" b="1" baseline="30000" dirty="0" smtClean="0">
-                <a:solidFill>
-                  <a:schemeClr val="bg1"/>
-                </a:solidFill>
-                <a:cs typeface="Arial" pitchFamily="34" charset="0"/>
-              </a:rPr>
-              <a:t>nd</a:t>
-            </a:r>
-            <a:r>
-              <a:rPr lang="en-US" b="1" dirty="0" smtClean="0">
-                <a:solidFill>
-                  <a:schemeClr val="bg1"/>
-                </a:solidFill>
-                <a:cs typeface="Arial" pitchFamily="34" charset="0"/>
-              </a:rPr>
-              <a:t> Annual </a:t>
-            </a:r>
-            <a:r>
-              <a:rPr lang="en-US" b="1" dirty="0">
-                <a:solidFill>
-                  <a:schemeClr val="bg1"/>
-                </a:solidFill>
-                <a:cs typeface="Arial" pitchFamily="34" charset="0"/>
-              </a:rPr>
-              <a:t>Meeting of </a:t>
-            </a:r>
-            <a:r>
-              <a:rPr lang="en-US" b="1" dirty="0" smtClean="0">
-                <a:solidFill>
-                  <a:schemeClr val="bg1"/>
-                </a:solidFill>
-                <a:cs typeface="Arial" pitchFamily="34" charset="0"/>
-              </a:rPr>
-              <a:t>the </a:t>
-            </a:r>
-            <a:r>
-              <a:rPr lang="en-US" b="1" dirty="0">
-                <a:solidFill>
-                  <a:schemeClr val="bg1"/>
-                </a:solidFill>
-                <a:cs typeface="Arial" pitchFamily="34" charset="0"/>
-              </a:rPr>
-              <a:t>Association for Computational </a:t>
-            </a:r>
-            <a:r>
-              <a:rPr lang="en-US" b="1" dirty="0" smtClean="0">
-                <a:solidFill>
-                  <a:schemeClr val="bg1"/>
-                </a:solidFill>
-                <a:cs typeface="Arial" pitchFamily="34" charset="0"/>
-              </a:rPr>
-              <a:t>Linguistics</a:t>
-            </a:r>
-          </a:p>
-          <a:p>
-            <a:pPr algn="ctr">
-              <a:defRPr/>
-            </a:pPr>
-            <a:endParaRPr lang="en-US" b="1" dirty="0">
-              <a:solidFill>
-                <a:schemeClr val="bg1"/>
-              </a:solidFill>
-              <a:cs typeface="Arial" pitchFamily="34" charset="0"/>
-            </a:endParaRPr>
-          </a:p>
-          <a:p>
-            <a:pPr algn="ctr">
-              <a:defRPr/>
-            </a:pPr>
-            <a:endParaRPr lang="en-US" b="1" dirty="0" smtClean="0">
-              <a:solidFill>
-                <a:schemeClr val="bg1"/>
-              </a:solidFill>
-              <a:cs typeface="Arial" pitchFamily="34" charset="0"/>
-            </a:endParaRPr>
-          </a:p>
-          <a:p>
-            <a:pPr algn="ctr">
-              <a:defRPr/>
-            </a:pPr>
-            <a:r>
-              <a:rPr lang="en-US" sz="4400" b="1" dirty="0" smtClean="0">
-                <a:solidFill>
-                  <a:schemeClr val="bg1"/>
-                </a:solidFill>
-                <a:latin typeface="+mj-lt"/>
-                <a:cs typeface="Arial" pitchFamily="34" charset="0"/>
-              </a:rPr>
-              <a:t>Conference Handbook</a:t>
-            </a:r>
-            <a:endParaRPr lang="en-US" sz="1100" b="1" dirty="0" smtClean="0">
-              <a:solidFill>
-                <a:schemeClr val="bg1"/>
-              </a:solidFill>
-              <a:latin typeface="+mj-lt"/>
-              <a:cs typeface="Arial" pitchFamily="34" charset="0"/>
-            </a:endParaRPr>
-          </a:p>
-          <a:p>
-            <a:pPr algn="ctr">
-              <a:defRPr/>
-            </a:pPr>
-            <a:endParaRPr lang="en-US" sz="1000" b="1" dirty="0" smtClean="0">
-              <a:solidFill>
-                <a:schemeClr val="bg1"/>
-              </a:solidFill>
-              <a:latin typeface="+mj-lt"/>
-              <a:cs typeface="Arial" pitchFamily="34" charset="0"/>
-            </a:endParaRPr>
-          </a:p>
-          <a:p>
-            <a:pPr algn="ctr">
-              <a:defRPr/>
-            </a:pPr>
-            <a:endParaRPr lang="en-US" sz="1600" b="1" dirty="0" smtClean="0">
-              <a:solidFill>
-                <a:schemeClr val="bg1"/>
-              </a:solidFill>
-              <a:latin typeface="+mj-lt"/>
-              <a:cs typeface="Arial" pitchFamily="34" charset="0"/>
-            </a:endParaRPr>
-          </a:p>
-        </p:txBody>
-      </p:sp>
-      <p:sp>
-        <p:nvSpPr>
-          <p:cNvPr id="19" name="Rectangle 18"/>
-          <p:cNvSpPr/>
-          <p:nvPr/>
-        </p:nvSpPr>
-        <p:spPr>
-          <a:xfrm>
-            <a:off x="607151" y="149974"/>
-            <a:ext cx="1143000" cy="457200"/>
-          </a:xfrm>
-          <a:prstGeom prst="rect">
-            <a:avLst/>
-          </a:prstGeom>
-          <a:solidFill>
-            <a:srgbClr val="FFFFFF"/>
-          </a:solidFill>
-          <a:ln>
-            <a:noFill/>
-          </a:ln>
-          <a:effectLst/>
-        </p:spPr>
-        <p:style>
-          <a:lnRef idx="1">
-            <a:schemeClr val="accent1"/>
-          </a:lnRef>
-          <a:fillRef idx="3">
-            <a:schemeClr val="accent1"/>
-          </a:fillRef>
-          <a:effectRef idx="2">
-            <a:schemeClr val="accent1"/>
-          </a:effectRef>
-          <a:fontRef idx="minor">
-            <a:schemeClr val="lt1"/>
-          </a:fontRef>
-        </p:style>
-        <p:txBody>
-          <a:bodyPr lIns="91425" tIns="45712" rIns="91425" bIns="45712" spcCol="0" rtlCol="0" anchor="ctr"/>
-          <a:lstStyle/>
-          <a:p>
-            <a:pPr algn="ctr"/>
-            <a:endParaRPr lang="en-US"/>
-          </a:p>
-        </p:txBody>
-      </p:sp>
-      <p:sp>
-        <p:nvSpPr>
-          <p:cNvPr id="3" name="TextBox 2"/>
-          <p:cNvSpPr txBox="1"/>
-          <p:nvPr/>
-        </p:nvSpPr>
-        <p:spPr>
-          <a:xfrm>
-            <a:off x="-25943" y="6991827"/>
-            <a:ext cx="5257800" cy="461665"/>
-          </a:xfrm>
-          <a:prstGeom prst="rect">
-            <a:avLst/>
-          </a:prstGeom>
-          <a:noFill/>
-        </p:spPr>
-        <p:txBody>
-          <a:bodyPr wrap="square" rtlCol="0">
-            <a:spAutoFit/>
-          </a:bodyPr>
-          <a:lstStyle/>
-          <a:p>
-            <a:pPr algn="ctr"/>
-            <a:r>
-              <a:rPr lang="en-US" sz="2400" dirty="0" smtClean="0">
-                <a:solidFill>
-                  <a:schemeClr val="tx2">
-                    <a:lumMod val="50000"/>
-                  </a:schemeClr>
-                </a:solidFill>
-              </a:rPr>
-              <a:t>ACL 2014 • June 22–27 • Baltimore</a:t>
-            </a:r>
-          </a:p>
-        </p:txBody>
-      </p:sp>
-      <p:pic>
-        <p:nvPicPr>
-          <p:cNvPr id="9" name="Picture 8"/>
-          <p:cNvPicPr>
-            <a:picLocks noChangeAspect="1"/>
-          </p:cNvPicPr>
-          <p:nvPr/>
-        </p:nvPicPr>
-        <p:blipFill>
-          <a:blip r:embed="rId3"/>
-          <a:stretch>
-            <a:fillRect/>
-          </a:stretch>
-        </p:blipFill>
-        <p:spPr>
-          <a:xfrm>
-            <a:off x="393833" y="6792875"/>
-            <a:ext cx="1363258" cy="922204"/>
-          </a:xfrm>
-          <a:prstGeom prst="rect">
-            <a:avLst/>
-          </a:prstGeom>
-        </p:spPr>
-      </p:pic>
-    </p:spTree>
-    <p:extLst>
-      <p:ext uri="{BB962C8B-B14F-4D97-AF65-F5344CB8AC3E}">
-        <p14:creationId xmlns:p14="http://schemas.microsoft.com/office/powerpoint/2010/main" val="1095361360"/>
       </p:ext>
     </p:extLst>
   </p:cSld>

</xml_diff>